<commit_message>
Minor updates to presentatioon
</commit_message>
<xml_diff>
--- a/Documentation/Propaganda/MixtapeStudio.pptx
+++ b/Documentation/Propaganda/MixtapeStudio.pptx
@@ -108,6 +108,11 @@
       </a:defRPr>
     </a:lvl9pPr>
   </p:defaultTextStyle>
+  <p:extLst>
+    <p:ext uri="{EFAFB233-063F-42B5-8137-9DF3F51BA10A}">
+      <p15:sldGuideLst xmlns:p15="http://schemas.microsoft.com/office/powerpoint/2012/main"/>
+    </p:ext>
+  </p:extLst>
 </p:presentation>
 </file>
 
@@ -8704,24 +8709,32 @@
                 <a:ea typeface="Prime" charset="0"/>
                 <a:cs typeface="Prime" charset="0"/>
               </a:rPr>
-              <a:t>Abstractions over </a:t>
-            </a:r>
-            <a:r>
-              <a:rPr lang="en-US" dirty="0" err="1" smtClean="0">
-                <a:latin typeface="Prime" charset="0"/>
-                <a:ea typeface="Prime" charset="0"/>
-                <a:cs typeface="Prime" charset="0"/>
-              </a:rPr>
-              <a:t>ints</a:t>
-            </a:r>
+              <a:t>Alternate instruments/sounds</a:t>
+            </a:r>
+          </a:p>
+          <a:p>
+            <a:pPr lvl="1"/>
             <a:r>
               <a:rPr lang="en-US" dirty="0" smtClean="0">
                 <a:latin typeface="Prime" charset="0"/>
                 <a:ea typeface="Prime" charset="0"/>
                 <a:cs typeface="Prime" charset="0"/>
               </a:rPr>
-              <a:t> as notes (i.e. mappings for A4, etc.)</a:t>
-            </a:r>
+              <a:t>Mappings for </a:t>
+            </a:r>
+            <a:r>
+              <a:rPr lang="en-US" smtClean="0">
+                <a:latin typeface="Prime" charset="0"/>
+                <a:ea typeface="Prime" charset="0"/>
+                <a:cs typeface="Prime" charset="0"/>
+              </a:rPr>
+              <a:t>more common notation forms (such as A4, C, etc.)</a:t>
+            </a:r>
+            <a:endParaRPr lang="en-US" dirty="0" smtClean="0">
+              <a:latin typeface="Prime" charset="0"/>
+              <a:ea typeface="Prime" charset="0"/>
+              <a:cs typeface="Prime" charset="0"/>
+            </a:endParaRPr>
           </a:p>
           <a:p>
             <a:pPr lvl="1"/>

</xml_diff>